<commit_message>
Modificação da página inicial com tarjas azuis
</commit_message>
<xml_diff>
--- a/PastaDocumentos/Pitch-Projeto.pptx
+++ b/PastaDocumentos/Pitch-Projeto.pptx
@@ -104,7 +104,20 @@
       </a:defRPr>
     </a:lvl9pPr>
   </p:defaultTextStyle>
+  <p:extLst>
+    <p:ext uri="{EFAFB233-063F-42B5-8137-9DF3F51BA10A}">
+      <p15:sldGuideLst xmlns:p15="http://schemas.microsoft.com/office/powerpoint/2012/main"/>
+    </p:ext>
+  </p:extLst>
 </p:presentation>
+</file>
+
+<file path=ppt/revisionInfo.xml><?xml version="1.0" encoding="utf-8"?>
+<p1510:revInfo xmlns:a="http://schemas.openxmlformats.org/drawingml/2006/main" xmlns:r="http://schemas.openxmlformats.org/officeDocument/2006/relationships" xmlns:p1510="http://schemas.microsoft.com/office/powerpoint/2015/10/main">
+  <p1510:revLst>
+    <p1510:client id="{C5426F79-1D32-4AE7-9CD5-596989CC7C57}" v="1" dt="2024-04-03T12:24:37.878"/>
+  </p1510:revLst>
+</p1510:revInfo>
 </file>
 
 <file path=ppt/changesInfos/changesInfo1.xml><?xml version="1.0" encoding="utf-8"?>
@@ -136,6 +149,38 @@
             <pc:docMk/>
             <pc:sldMk cId="1122955671" sldId="256"/>
             <ac:spMk id="3" creationId="{A7C0C077-4FFE-33B2-C2AF-12D9F571E840}"/>
+          </ac:spMkLst>
+        </pc:spChg>
+      </pc:sldChg>
+    </pc:docChg>
+  </pc:docChgLst>
+  <pc:docChgLst>
+    <pc:chgData name="Felipe Enge" userId="43286854872361c4" providerId="LiveId" clId="{C5426F79-1D32-4AE7-9CD5-596989CC7C57}"/>
+    <pc:docChg chg="modSld">
+      <pc:chgData name="Felipe Enge" userId="43286854872361c4" providerId="LiveId" clId="{C5426F79-1D32-4AE7-9CD5-596989CC7C57}" dt="2024-04-03T12:24:44.031" v="3" actId="1076"/>
+      <pc:docMkLst>
+        <pc:docMk/>
+      </pc:docMkLst>
+      <pc:sldChg chg="addSp modSp mod">
+        <pc:chgData name="Felipe Enge" userId="43286854872361c4" providerId="LiveId" clId="{C5426F79-1D32-4AE7-9CD5-596989CC7C57}" dt="2024-04-03T12:24:44.031" v="3" actId="1076"/>
+        <pc:sldMkLst>
+          <pc:docMk/>
+          <pc:sldMk cId="1122955671" sldId="256"/>
+        </pc:sldMkLst>
+        <pc:spChg chg="add mod">
+          <ac:chgData name="Felipe Enge" userId="43286854872361c4" providerId="LiveId" clId="{C5426F79-1D32-4AE7-9CD5-596989CC7C57}" dt="2024-04-03T12:24:36.235" v="1" actId="1076"/>
+          <ac:spMkLst>
+            <pc:docMk/>
+            <pc:sldMk cId="1122955671" sldId="256"/>
+            <ac:spMk id="4" creationId="{9B735EDB-E906-D259-CC29-AC9887D53976}"/>
+          </ac:spMkLst>
+        </pc:spChg>
+        <pc:spChg chg="add mod">
+          <ac:chgData name="Felipe Enge" userId="43286854872361c4" providerId="LiveId" clId="{C5426F79-1D32-4AE7-9CD5-596989CC7C57}" dt="2024-04-03T12:24:44.031" v="3" actId="1076"/>
+          <ac:spMkLst>
+            <pc:docMk/>
+            <pc:sldMk cId="1122955671" sldId="256"/>
+            <ac:spMk id="5" creationId="{4092A43C-AD75-0009-DD08-BE224CD93CA7}"/>
           </ac:spMkLst>
         </pc:spChg>
       </pc:sldChg>
@@ -3417,6 +3462,98 @@
               <a:t>git</a:t>
             </a:r>
             <a:endParaRPr lang="pt-BR" dirty="0"/>
+          </a:p>
+        </p:txBody>
+      </p:sp>
+      <p:sp>
+        <p:nvSpPr>
+          <p:cNvPr id="4" name="Retângulo 3">
+            <a:extLst>
+              <a:ext uri="{FF2B5EF4-FFF2-40B4-BE49-F238E27FC236}">
+                <a16:creationId xmlns:a16="http://schemas.microsoft.com/office/drawing/2014/main" id="{9B735EDB-E906-D259-CC29-AC9887D53976}"/>
+              </a:ext>
+            </a:extLst>
+          </p:cNvPr>
+          <p:cNvSpPr/>
+          <p:nvPr/>
+        </p:nvSpPr>
+        <p:spPr>
+          <a:xfrm>
+            <a:off x="2617365" y="1980603"/>
+            <a:ext cx="7130642" cy="335560"/>
+          </a:xfrm>
+          <a:prstGeom prst="rect">
+            <a:avLst/>
+          </a:prstGeom>
+        </p:spPr>
+        <p:style>
+          <a:lnRef idx="2">
+            <a:schemeClr val="accent1">
+              <a:shade val="15000"/>
+            </a:schemeClr>
+          </a:lnRef>
+          <a:fillRef idx="1">
+            <a:schemeClr val="accent1"/>
+          </a:fillRef>
+          <a:effectRef idx="0">
+            <a:schemeClr val="accent1"/>
+          </a:effectRef>
+          <a:fontRef idx="minor">
+            <a:schemeClr val="lt1"/>
+          </a:fontRef>
+        </p:style>
+        <p:txBody>
+          <a:bodyPr rtlCol="0" anchor="ctr"/>
+          <a:lstStyle/>
+          <a:p>
+            <a:pPr algn="ctr"/>
+            <a:endParaRPr lang="pt-BR"/>
+          </a:p>
+        </p:txBody>
+      </p:sp>
+      <p:sp>
+        <p:nvSpPr>
+          <p:cNvPr id="5" name="Retângulo 4">
+            <a:extLst>
+              <a:ext uri="{FF2B5EF4-FFF2-40B4-BE49-F238E27FC236}">
+                <a16:creationId xmlns:a16="http://schemas.microsoft.com/office/drawing/2014/main" id="{4092A43C-AD75-0009-DD08-BE224CD93CA7}"/>
+              </a:ext>
+            </a:extLst>
+          </p:cNvPr>
+          <p:cNvSpPr/>
+          <p:nvPr/>
+        </p:nvSpPr>
+        <p:spPr>
+          <a:xfrm>
+            <a:off x="2617365" y="4314374"/>
+            <a:ext cx="7130642" cy="335560"/>
+          </a:xfrm>
+          <a:prstGeom prst="rect">
+            <a:avLst/>
+          </a:prstGeom>
+        </p:spPr>
+        <p:style>
+          <a:lnRef idx="2">
+            <a:schemeClr val="accent1">
+              <a:shade val="15000"/>
+            </a:schemeClr>
+          </a:lnRef>
+          <a:fillRef idx="1">
+            <a:schemeClr val="accent1"/>
+          </a:fillRef>
+          <a:effectRef idx="0">
+            <a:schemeClr val="accent1"/>
+          </a:effectRef>
+          <a:fontRef idx="minor">
+            <a:schemeClr val="lt1"/>
+          </a:fontRef>
+        </p:style>
+        <p:txBody>
+          <a:bodyPr rtlCol="0" anchor="ctr"/>
+          <a:lstStyle/>
+          <a:p>
+            <a:pPr algn="ctr"/>
+            <a:endParaRPr lang="pt-BR"/>
           </a:p>
         </p:txBody>
       </p:sp>

</xml_diff>

<commit_message>
Recuperação da versão original do Pitch
Recuperação da versão original do Pitch (1a versão)
</commit_message>
<xml_diff>
--- a/PastaDocumentos/Pitch-Projeto.pptx
+++ b/PastaDocumentos/Pitch-Projeto.pptx
@@ -104,20 +104,7 @@
       </a:defRPr>
     </a:lvl9pPr>
   </p:defaultTextStyle>
-  <p:extLst>
-    <p:ext uri="{EFAFB233-063F-42B5-8137-9DF3F51BA10A}">
-      <p15:sldGuideLst xmlns:p15="http://schemas.microsoft.com/office/powerpoint/2012/main"/>
-    </p:ext>
-  </p:extLst>
 </p:presentation>
-</file>
-
-<file path=ppt/revisionInfo.xml><?xml version="1.0" encoding="utf-8"?>
-<p1510:revInfo xmlns:a="http://schemas.openxmlformats.org/drawingml/2006/main" xmlns:r="http://schemas.openxmlformats.org/officeDocument/2006/relationships" xmlns:p1510="http://schemas.microsoft.com/office/powerpoint/2015/10/main">
-  <p1510:revLst>
-    <p1510:client id="{C5426F79-1D32-4AE7-9CD5-596989CC7C57}" v="1" dt="2024-04-03T12:24:37.878"/>
-  </p1510:revLst>
-</p1510:revInfo>
 </file>
 
 <file path=ppt/changesInfos/changesInfo1.xml><?xml version="1.0" encoding="utf-8"?>
@@ -149,38 +136,6 @@
             <pc:docMk/>
             <pc:sldMk cId="1122955671" sldId="256"/>
             <ac:spMk id="3" creationId="{A7C0C077-4FFE-33B2-C2AF-12D9F571E840}"/>
-          </ac:spMkLst>
-        </pc:spChg>
-      </pc:sldChg>
-    </pc:docChg>
-  </pc:docChgLst>
-  <pc:docChgLst>
-    <pc:chgData name="Felipe Enge" userId="43286854872361c4" providerId="LiveId" clId="{C5426F79-1D32-4AE7-9CD5-596989CC7C57}"/>
-    <pc:docChg chg="modSld">
-      <pc:chgData name="Felipe Enge" userId="43286854872361c4" providerId="LiveId" clId="{C5426F79-1D32-4AE7-9CD5-596989CC7C57}" dt="2024-04-03T12:24:44.031" v="3" actId="1076"/>
-      <pc:docMkLst>
-        <pc:docMk/>
-      </pc:docMkLst>
-      <pc:sldChg chg="addSp modSp mod">
-        <pc:chgData name="Felipe Enge" userId="43286854872361c4" providerId="LiveId" clId="{C5426F79-1D32-4AE7-9CD5-596989CC7C57}" dt="2024-04-03T12:24:44.031" v="3" actId="1076"/>
-        <pc:sldMkLst>
-          <pc:docMk/>
-          <pc:sldMk cId="1122955671" sldId="256"/>
-        </pc:sldMkLst>
-        <pc:spChg chg="add mod">
-          <ac:chgData name="Felipe Enge" userId="43286854872361c4" providerId="LiveId" clId="{C5426F79-1D32-4AE7-9CD5-596989CC7C57}" dt="2024-04-03T12:24:36.235" v="1" actId="1076"/>
-          <ac:spMkLst>
-            <pc:docMk/>
-            <pc:sldMk cId="1122955671" sldId="256"/>
-            <ac:spMk id="4" creationId="{9B735EDB-E906-D259-CC29-AC9887D53976}"/>
-          </ac:spMkLst>
-        </pc:spChg>
-        <pc:spChg chg="add mod">
-          <ac:chgData name="Felipe Enge" userId="43286854872361c4" providerId="LiveId" clId="{C5426F79-1D32-4AE7-9CD5-596989CC7C57}" dt="2024-04-03T12:24:44.031" v="3" actId="1076"/>
-          <ac:spMkLst>
-            <pc:docMk/>
-            <pc:sldMk cId="1122955671" sldId="256"/>
-            <ac:spMk id="5" creationId="{4092A43C-AD75-0009-DD08-BE224CD93CA7}"/>
           </ac:spMkLst>
         </pc:spChg>
       </pc:sldChg>
@@ -3462,98 +3417,6 @@
               <a:t>git</a:t>
             </a:r>
             <a:endParaRPr lang="pt-BR" dirty="0"/>
-          </a:p>
-        </p:txBody>
-      </p:sp>
-      <p:sp>
-        <p:nvSpPr>
-          <p:cNvPr id="4" name="Retângulo 3">
-            <a:extLst>
-              <a:ext uri="{FF2B5EF4-FFF2-40B4-BE49-F238E27FC236}">
-                <a16:creationId xmlns:a16="http://schemas.microsoft.com/office/drawing/2014/main" id="{9B735EDB-E906-D259-CC29-AC9887D53976}"/>
-              </a:ext>
-            </a:extLst>
-          </p:cNvPr>
-          <p:cNvSpPr/>
-          <p:nvPr/>
-        </p:nvSpPr>
-        <p:spPr>
-          <a:xfrm>
-            <a:off x="2617365" y="1980603"/>
-            <a:ext cx="7130642" cy="335560"/>
-          </a:xfrm>
-          <a:prstGeom prst="rect">
-            <a:avLst/>
-          </a:prstGeom>
-        </p:spPr>
-        <p:style>
-          <a:lnRef idx="2">
-            <a:schemeClr val="accent1">
-              <a:shade val="15000"/>
-            </a:schemeClr>
-          </a:lnRef>
-          <a:fillRef idx="1">
-            <a:schemeClr val="accent1"/>
-          </a:fillRef>
-          <a:effectRef idx="0">
-            <a:schemeClr val="accent1"/>
-          </a:effectRef>
-          <a:fontRef idx="minor">
-            <a:schemeClr val="lt1"/>
-          </a:fontRef>
-        </p:style>
-        <p:txBody>
-          <a:bodyPr rtlCol="0" anchor="ctr"/>
-          <a:lstStyle/>
-          <a:p>
-            <a:pPr algn="ctr"/>
-            <a:endParaRPr lang="pt-BR"/>
-          </a:p>
-        </p:txBody>
-      </p:sp>
-      <p:sp>
-        <p:nvSpPr>
-          <p:cNvPr id="5" name="Retângulo 4">
-            <a:extLst>
-              <a:ext uri="{FF2B5EF4-FFF2-40B4-BE49-F238E27FC236}">
-                <a16:creationId xmlns:a16="http://schemas.microsoft.com/office/drawing/2014/main" id="{4092A43C-AD75-0009-DD08-BE224CD93CA7}"/>
-              </a:ext>
-            </a:extLst>
-          </p:cNvPr>
-          <p:cNvSpPr/>
-          <p:nvPr/>
-        </p:nvSpPr>
-        <p:spPr>
-          <a:xfrm>
-            <a:off x="2617365" y="4314374"/>
-            <a:ext cx="7130642" cy="335560"/>
-          </a:xfrm>
-          <a:prstGeom prst="rect">
-            <a:avLst/>
-          </a:prstGeom>
-        </p:spPr>
-        <p:style>
-          <a:lnRef idx="2">
-            <a:schemeClr val="accent1">
-              <a:shade val="15000"/>
-            </a:schemeClr>
-          </a:lnRef>
-          <a:fillRef idx="1">
-            <a:schemeClr val="accent1"/>
-          </a:fillRef>
-          <a:effectRef idx="0">
-            <a:schemeClr val="accent1"/>
-          </a:effectRef>
-          <a:fontRef idx="minor">
-            <a:schemeClr val="lt1"/>
-          </a:fontRef>
-        </p:style>
-        <p:txBody>
-          <a:bodyPr rtlCol="0" anchor="ctr"/>
-          <a:lstStyle/>
-          <a:p>
-            <a:pPr algn="ctr"/>
-            <a:endParaRPr lang="pt-BR"/>
           </a:p>
         </p:txBody>
       </p:sp>

</xml_diff>